<commit_message>
Visitor design patter ppt
</commit_message>
<xml_diff>
--- a/Visitor Pattern.pptx
+++ b/Visitor Pattern.pptx
@@ -5,19 +5,20 @@
     <p:sldMasterId id="2147483648" r:id="rId1"/>
   </p:sldMasterIdLst>
   <p:notesMasterIdLst>
-    <p:notesMasterId r:id="rId12"/>
+    <p:notesMasterId r:id="rId13"/>
   </p:notesMasterIdLst>
   <p:sldIdLst>
     <p:sldId id="256" r:id="rId2"/>
     <p:sldId id="258" r:id="rId3"/>
     <p:sldId id="260" r:id="rId4"/>
     <p:sldId id="259" r:id="rId5"/>
-    <p:sldId id="263" r:id="rId6"/>
-    <p:sldId id="261" r:id="rId7"/>
-    <p:sldId id="262" r:id="rId8"/>
-    <p:sldId id="264" r:id="rId9"/>
-    <p:sldId id="265" r:id="rId10"/>
-    <p:sldId id="266" r:id="rId11"/>
+    <p:sldId id="267" r:id="rId6"/>
+    <p:sldId id="263" r:id="rId7"/>
+    <p:sldId id="261" r:id="rId8"/>
+    <p:sldId id="262" r:id="rId9"/>
+    <p:sldId id="264" r:id="rId10"/>
+    <p:sldId id="265" r:id="rId11"/>
+    <p:sldId id="266" r:id="rId12"/>
   </p:sldIdLst>
   <p:sldSz cx="12192000" cy="6858000"/>
   <p:notesSz cx="6858000" cy="9144000"/>
@@ -206,7 +207,7 @@
           <a:p>
             <a:fld id="{86AD048D-EBF2-4838-8B0F-E2CED0BDFDFD}" type="datetimeFigureOut">
               <a:rPr lang="en-US" smtClean="0"/>
-              <a:t>5/1/2018</a:t>
+              <a:t>5/3/2018</a:t>
             </a:fld>
             <a:endParaRPr lang="en-US"/>
           </a:p>
@@ -806,7 +807,7 @@
             <a:fld id="{B61BEF0D-F0BB-DE4B-95CE-6DB70DBA9567}" type="datetimeFigureOut">
               <a:rPr lang="en-US" dirty="0"/>
               <a:pPr/>
-              <a:t>5/1/2018</a:t>
+              <a:t>5/3/2018</a:t>
             </a:fld>
             <a:endParaRPr lang="en-US" dirty="0"/>
           </a:p>
@@ -1127,7 +1128,7 @@
             <a:fld id="{B61BEF0D-F0BB-DE4B-95CE-6DB70DBA9567}" type="datetimeFigureOut">
               <a:rPr lang="en-US" dirty="0"/>
               <a:pPr/>
-              <a:t>5/1/2018</a:t>
+              <a:t>5/3/2018</a:t>
             </a:fld>
             <a:endParaRPr lang="en-US" dirty="0"/>
           </a:p>
@@ -1372,7 +1373,7 @@
             <a:fld id="{B61BEF0D-F0BB-DE4B-95CE-6DB70DBA9567}" type="datetimeFigureOut">
               <a:rPr lang="en-US" dirty="0"/>
               <a:pPr/>
-              <a:t>5/1/2018</a:t>
+              <a:t>5/3/2018</a:t>
             </a:fld>
             <a:endParaRPr lang="en-US" dirty="0"/>
           </a:p>
@@ -1708,7 +1709,7 @@
             <a:fld id="{B61BEF0D-F0BB-DE4B-95CE-6DB70DBA9567}" type="datetimeFigureOut">
               <a:rPr lang="en-US" dirty="0"/>
               <a:pPr/>
-              <a:t>5/1/2018</a:t>
+              <a:t>5/3/2018</a:t>
             </a:fld>
             <a:endParaRPr lang="en-US" dirty="0"/>
           </a:p>
@@ -2052,7 +2053,7 @@
             <a:fld id="{B61BEF0D-F0BB-DE4B-95CE-6DB70DBA9567}" type="datetimeFigureOut">
               <a:rPr lang="en-US" dirty="0"/>
               <a:pPr/>
-              <a:t>5/1/2018</a:t>
+              <a:t>5/3/2018</a:t>
             </a:fld>
             <a:endParaRPr lang="en-US" dirty="0"/>
           </a:p>
@@ -2423,7 +2424,7 @@
             <a:fld id="{B61BEF0D-F0BB-DE4B-95CE-6DB70DBA9567}" type="datetimeFigureOut">
               <a:rPr lang="en-US" dirty="0"/>
               <a:pPr/>
-              <a:t>5/1/2018</a:t>
+              <a:t>5/3/2018</a:t>
             </a:fld>
             <a:endParaRPr lang="en-US" dirty="0"/>
           </a:p>
@@ -2890,7 +2891,7 @@
             <a:fld id="{B61BEF0D-F0BB-DE4B-95CE-6DB70DBA9567}" type="datetimeFigureOut">
               <a:rPr lang="en-US" dirty="0"/>
               <a:pPr/>
-              <a:t>5/1/2018</a:t>
+              <a:t>5/3/2018</a:t>
             </a:fld>
             <a:endParaRPr lang="en-US" dirty="0"/>
           </a:p>
@@ -3092,7 +3093,7 @@
             <a:fld id="{B61BEF0D-F0BB-DE4B-95CE-6DB70DBA9567}" type="datetimeFigureOut">
               <a:rPr lang="en-US" dirty="0"/>
               <a:pPr/>
-              <a:t>5/1/2018</a:t>
+              <a:t>5/3/2018</a:t>
             </a:fld>
             <a:endParaRPr lang="en-US" dirty="0"/>
           </a:p>
@@ -3300,7 +3301,7 @@
             <a:fld id="{B61BEF0D-F0BB-DE4B-95CE-6DB70DBA9567}" type="datetimeFigureOut">
               <a:rPr lang="en-US" dirty="0"/>
               <a:pPr/>
-              <a:t>5/1/2018</a:t>
+              <a:t>5/3/2018</a:t>
             </a:fld>
             <a:endParaRPr lang="en-US" dirty="0"/>
           </a:p>
@@ -3528,7 +3529,7 @@
           <a:p>
             <a:fld id="{05BFA754-D5C3-4E66-96A6-867B257F58DC}" type="datetimeFigureOut">
               <a:rPr lang="en-US" dirty="0"/>
-              <a:t>5/1/2018</a:t>
+              <a:t>5/3/2018</a:t>
             </a:fld>
             <a:endParaRPr lang="en-US" dirty="0"/>
           </a:p>
@@ -3772,7 +3773,7 @@
             <a:fld id="{B61BEF0D-F0BB-DE4B-95CE-6DB70DBA9567}" type="datetimeFigureOut">
               <a:rPr lang="en-US" dirty="0"/>
               <a:pPr/>
-              <a:t>5/1/2018</a:t>
+              <a:t>5/3/2018</a:t>
             </a:fld>
             <a:endParaRPr lang="en-US" dirty="0"/>
           </a:p>
@@ -4035,7 +4036,7 @@
           <a:p>
             <a:fld id="{05BFA754-D5C3-4E66-96A6-867B257F58DC}" type="datetimeFigureOut">
               <a:rPr lang="en-US" dirty="0"/>
-              <a:t>5/1/2018</a:t>
+              <a:t>5/3/2018</a:t>
             </a:fld>
             <a:endParaRPr lang="en-US" dirty="0"/>
           </a:p>
@@ -4444,7 +4445,7 @@
             <a:fld id="{B61BEF0D-F0BB-DE4B-95CE-6DB70DBA9567}" type="datetimeFigureOut">
               <a:rPr lang="en-US" dirty="0"/>
               <a:pPr/>
-              <a:t>5/1/2018</a:t>
+              <a:t>5/3/2018</a:t>
             </a:fld>
             <a:endParaRPr lang="en-US" dirty="0"/>
           </a:p>
@@ -4590,7 +4591,7 @@
             <a:fld id="{B61BEF0D-F0BB-DE4B-95CE-6DB70DBA9567}" type="datetimeFigureOut">
               <a:rPr lang="en-US" dirty="0"/>
               <a:pPr/>
-              <a:t>5/1/2018</a:t>
+              <a:t>5/3/2018</a:t>
             </a:fld>
             <a:endParaRPr lang="en-US" dirty="0"/>
           </a:p>
@@ -4713,7 +4714,7 @@
             <a:fld id="{B61BEF0D-F0BB-DE4B-95CE-6DB70DBA9567}" type="datetimeFigureOut">
               <a:rPr lang="en-US" dirty="0"/>
               <a:pPr/>
-              <a:t>5/1/2018</a:t>
+              <a:t>5/3/2018</a:t>
             </a:fld>
             <a:endParaRPr lang="en-US" dirty="0"/>
           </a:p>
@@ -4965,7 +4966,7 @@
             <a:fld id="{B61BEF0D-F0BB-DE4B-95CE-6DB70DBA9567}" type="datetimeFigureOut">
               <a:rPr lang="en-US" dirty="0"/>
               <a:pPr/>
-              <a:t>5/1/2018</a:t>
+              <a:t>5/3/2018</a:t>
             </a:fld>
             <a:endParaRPr lang="en-US" dirty="0"/>
           </a:p>
@@ -5277,7 +5278,7 @@
             <a:fld id="{B61BEF0D-F0BB-DE4B-95CE-6DB70DBA9567}" type="datetimeFigureOut">
               <a:rPr lang="en-US" dirty="0"/>
               <a:pPr/>
-              <a:t>5/1/2018</a:t>
+              <a:t>5/3/2018</a:t>
             </a:fld>
             <a:endParaRPr lang="en-US" dirty="0"/>
           </a:p>
@@ -5625,7 +5626,7 @@
             <a:fld id="{B61BEF0D-F0BB-DE4B-95CE-6DB70DBA9567}" type="datetimeFigureOut">
               <a:rPr lang="en-US" dirty="0"/>
               <a:pPr/>
-              <a:t>5/1/2018</a:t>
+              <a:t>5/3/2018</a:t>
             </a:fld>
             <a:endParaRPr lang="en-US" dirty="0"/>
           </a:p>
@@ -6208,6 +6209,174 @@
 </file>
 
 <file path=ppt/slides/slide10.xml><?xml version="1.0" encoding="utf-8"?>
+<p:sld xmlns:a="http://schemas.openxmlformats.org/drawingml/2006/main" xmlns:r="http://schemas.openxmlformats.org/officeDocument/2006/relationships" xmlns:p="http://schemas.openxmlformats.org/presentationml/2006/main">
+  <p:cSld>
+    <p:spTree>
+      <p:nvGrpSpPr>
+        <p:cNvPr id="1" name=""/>
+        <p:cNvGrpSpPr/>
+        <p:nvPr/>
+      </p:nvGrpSpPr>
+      <p:grpSpPr>
+        <a:xfrm>
+          <a:off x="0" y="0"/>
+          <a:ext cx="0" cy="0"/>
+          <a:chOff x="0" y="0"/>
+          <a:chExt cx="0" cy="0"/>
+        </a:xfrm>
+      </p:grpSpPr>
+      <p:sp>
+        <p:nvSpPr>
+          <p:cNvPr id="3" name="Title 1"/>
+          <p:cNvSpPr txBox="1">
+            <a:spLocks/>
+          </p:cNvSpPr>
+          <p:nvPr/>
+        </p:nvSpPr>
+        <p:spPr>
+          <a:xfrm>
+            <a:off x="1372676" y="822025"/>
+            <a:ext cx="9601196" cy="1303867"/>
+          </a:xfrm>
+          <a:prstGeom prst="rect">
+            <a:avLst/>
+          </a:prstGeom>
+        </p:spPr>
+        <p:txBody>
+          <a:bodyPr/>
+          <a:lstStyle>
+            <a:lvl1pPr algn="ctr" defTabSz="457200" rtl="0" eaLnBrk="1" latinLnBrk="0" hangingPunct="1">
+              <a:spcBef>
+                <a:spcPct val="0"/>
+              </a:spcBef>
+              <a:buNone/>
+              <a:defRPr sz="4400" kern="1200" cap="none">
+                <a:ln w="3175" cmpd="sng">
+                  <a:noFill/>
+                </a:ln>
+                <a:solidFill>
+                  <a:schemeClr val="tx1">
+                    <a:lumMod val="85000"/>
+                    <a:lumOff val="15000"/>
+                  </a:schemeClr>
+                </a:solidFill>
+                <a:effectLst/>
+                <a:latin typeface="+mj-lt"/>
+                <a:ea typeface="+mj-ea"/>
+                <a:cs typeface="+mj-cs"/>
+              </a:defRPr>
+            </a:lvl1pPr>
+            <a:lvl2pPr eaLnBrk="1" hangingPunct="1">
+              <a:defRPr>
+                <a:solidFill>
+                  <a:schemeClr val="tx2"/>
+                </a:solidFill>
+              </a:defRPr>
+            </a:lvl2pPr>
+            <a:lvl3pPr eaLnBrk="1" hangingPunct="1">
+              <a:defRPr>
+                <a:solidFill>
+                  <a:schemeClr val="tx2"/>
+                </a:solidFill>
+              </a:defRPr>
+            </a:lvl3pPr>
+            <a:lvl4pPr eaLnBrk="1" hangingPunct="1">
+              <a:defRPr>
+                <a:solidFill>
+                  <a:schemeClr val="tx2"/>
+                </a:solidFill>
+              </a:defRPr>
+            </a:lvl4pPr>
+            <a:lvl5pPr eaLnBrk="1" hangingPunct="1">
+              <a:defRPr>
+                <a:solidFill>
+                  <a:schemeClr val="tx2"/>
+                </a:solidFill>
+              </a:defRPr>
+            </a:lvl5pPr>
+            <a:lvl6pPr eaLnBrk="1" hangingPunct="1">
+              <a:defRPr>
+                <a:solidFill>
+                  <a:schemeClr val="tx2"/>
+                </a:solidFill>
+              </a:defRPr>
+            </a:lvl6pPr>
+            <a:lvl7pPr eaLnBrk="1" hangingPunct="1">
+              <a:defRPr>
+                <a:solidFill>
+                  <a:schemeClr val="tx2"/>
+                </a:solidFill>
+              </a:defRPr>
+            </a:lvl7pPr>
+            <a:lvl8pPr eaLnBrk="1" hangingPunct="1">
+              <a:defRPr>
+                <a:solidFill>
+                  <a:schemeClr val="tx2"/>
+                </a:solidFill>
+              </a:defRPr>
+            </a:lvl8pPr>
+            <a:lvl9pPr eaLnBrk="1" hangingPunct="1">
+              <a:defRPr>
+                <a:solidFill>
+                  <a:schemeClr val="tx2"/>
+                </a:solidFill>
+              </a:defRPr>
+            </a:lvl9pPr>
+          </a:lstStyle>
+          <a:p>
+            <a:r>
+              <a:rPr lang="en-US" dirty="0" smtClean="0"/>
+              <a:t>Classes</a:t>
+            </a:r>
+            <a:endParaRPr lang="en-US" b="1" dirty="0"/>
+          </a:p>
+        </p:txBody>
+      </p:sp>
+      <p:pic>
+        <p:nvPicPr>
+          <p:cNvPr id="2" name="Picture 1"/>
+          <p:cNvPicPr>
+            <a:picLocks noChangeAspect="1"/>
+          </p:cNvPicPr>
+          <p:nvPr/>
+        </p:nvPicPr>
+        <p:blipFill>
+          <a:blip r:embed="rId2"/>
+          <a:stretch>
+            <a:fillRect/>
+          </a:stretch>
+        </p:blipFill>
+        <p:spPr>
+          <a:xfrm>
+            <a:off x="772260" y="994091"/>
+            <a:ext cx="4211864" cy="5119876"/>
+          </a:xfrm>
+          <a:prstGeom prst="rect">
+            <a:avLst/>
+          </a:prstGeom>
+        </p:spPr>
+      </p:pic>
+    </p:spTree>
+    <p:extLst>
+      <p:ext uri="{BB962C8B-B14F-4D97-AF65-F5344CB8AC3E}">
+        <p14:creationId xmlns:p14="http://schemas.microsoft.com/office/powerpoint/2010/main" val="3439156172"/>
+      </p:ext>
+    </p:extLst>
+  </p:cSld>
+  <p:clrMapOvr>
+    <a:masterClrMapping/>
+  </p:clrMapOvr>
+  <p:timing>
+    <p:tnLst>
+      <p:par>
+        <p:cTn id="1" dur="indefinite" restart="never" nodeType="tmRoot"/>
+      </p:par>
+    </p:tnLst>
+  </p:timing>
+</p:sld>
+</file>
+
+<file path=ppt/slides/slide11.xml><?xml version="1.0" encoding="utf-8"?>
 <p:sld xmlns:a="http://schemas.openxmlformats.org/drawingml/2006/main" xmlns:r="http://schemas.openxmlformats.org/officeDocument/2006/relationships" xmlns:p="http://schemas.openxmlformats.org/presentationml/2006/main">
   <p:cSld>
     <p:spTree>
@@ -7886,6 +8055,77 @@
           <a:chExt cx="0" cy="0"/>
         </a:xfrm>
       </p:grpSpPr>
+      <p:pic>
+        <p:nvPicPr>
+          <p:cNvPr id="1026" name="Picture 2" descr="https://3.bp.blogspot.com/-TYcmyeDjIXo/WsPSRZJeEDI/AAAAAAAAHko/9wfexozeH2ItO0L8ZNx2lCVC17tkNvt4ACLcBGAs/s640/visitor-example.PNG"/>
+          <p:cNvPicPr>
+            <a:picLocks noChangeAspect="1" noChangeArrowheads="1"/>
+          </p:cNvPicPr>
+          <p:nvPr/>
+        </p:nvPicPr>
+        <p:blipFill>
+          <a:blip r:embed="rId2">
+            <a:extLst>
+              <a:ext uri="{28A0092B-C50C-407E-A947-70E740481C1C}">
+                <a14:useLocalDpi xmlns:a14="http://schemas.microsoft.com/office/drawing/2010/main" val="0"/>
+              </a:ext>
+            </a:extLst>
+          </a:blip>
+          <a:srcRect/>
+          <a:stretch>
+            <a:fillRect/>
+          </a:stretch>
+        </p:blipFill>
+        <p:spPr bwMode="auto">
+          <a:xfrm>
+            <a:off x="1284159" y="1420634"/>
+            <a:ext cx="9328031" cy="4183040"/>
+          </a:xfrm>
+          <a:prstGeom prst="rect">
+            <a:avLst/>
+          </a:prstGeom>
+          <a:noFill/>
+          <a:extLst>
+            <a:ext uri="{909E8E84-426E-40DD-AFC4-6F175D3DCCD1}">
+              <a14:hiddenFill xmlns:a14="http://schemas.microsoft.com/office/drawing/2010/main">
+                <a:solidFill>
+                  <a:srgbClr val="FFFFFF"/>
+                </a:solidFill>
+              </a14:hiddenFill>
+            </a:ext>
+          </a:extLst>
+        </p:spPr>
+      </p:pic>
+    </p:spTree>
+    <p:extLst>
+      <p:ext uri="{BB962C8B-B14F-4D97-AF65-F5344CB8AC3E}">
+        <p14:creationId xmlns:p14="http://schemas.microsoft.com/office/powerpoint/2010/main" val="3354822392"/>
+      </p:ext>
+    </p:extLst>
+  </p:cSld>
+  <p:clrMapOvr>
+    <a:masterClrMapping/>
+  </p:clrMapOvr>
+</p:sld>
+</file>
+
+<file path=ppt/slides/slide6.xml><?xml version="1.0" encoding="utf-8"?>
+<p:sld xmlns:a="http://schemas.openxmlformats.org/drawingml/2006/main" xmlns:r="http://schemas.openxmlformats.org/officeDocument/2006/relationships" xmlns:p="http://schemas.openxmlformats.org/presentationml/2006/main">
+  <p:cSld>
+    <p:spTree>
+      <p:nvGrpSpPr>
+        <p:cNvPr id="1" name=""/>
+        <p:cNvGrpSpPr/>
+        <p:nvPr/>
+      </p:nvGrpSpPr>
+      <p:grpSpPr>
+        <a:xfrm>
+          <a:off x="0" y="0"/>
+          <a:ext cx="0" cy="0"/>
+          <a:chOff x="0" y="0"/>
+          <a:chExt cx="0" cy="0"/>
+        </a:xfrm>
+      </p:grpSpPr>
       <p:sp>
         <p:nvSpPr>
           <p:cNvPr id="3" name="Title 1"/>
@@ -8037,7 +8277,7 @@
 </p:sld>
 </file>
 
-<file path=ppt/slides/slide6.xml><?xml version="1.0" encoding="utf-8"?>
+<file path=ppt/slides/slide7.xml><?xml version="1.0" encoding="utf-8"?>
 <p:sld xmlns:a="http://schemas.openxmlformats.org/drawingml/2006/main" xmlns:r="http://schemas.openxmlformats.org/officeDocument/2006/relationships" xmlns:p="http://schemas.openxmlformats.org/presentationml/2006/main">
   <p:cSld>
     <p:spTree>
@@ -8122,7 +8362,7 @@
 </p:sld>
 </file>
 
-<file path=ppt/slides/slide7.xml><?xml version="1.0" encoding="utf-8"?>
+<file path=ppt/slides/slide8.xml><?xml version="1.0" encoding="utf-8"?>
 <p:sld xmlns:a="http://schemas.openxmlformats.org/drawingml/2006/main" xmlns:r="http://schemas.openxmlformats.org/officeDocument/2006/relationships" xmlns:p="http://schemas.openxmlformats.org/presentationml/2006/main">
   <p:cSld>
     <p:spTree>
@@ -8290,7 +8530,7 @@
 </p:sld>
 </file>
 
-<file path=ppt/slides/slide8.xml><?xml version="1.0" encoding="utf-8"?>
+<file path=ppt/slides/slide9.xml><?xml version="1.0" encoding="utf-8"?>
 <p:sld xmlns:a="http://schemas.openxmlformats.org/drawingml/2006/main" xmlns:r="http://schemas.openxmlformats.org/officeDocument/2006/relationships" xmlns:p="http://schemas.openxmlformats.org/presentationml/2006/main">
   <p:cSld>
     <p:spTree>
@@ -8442,174 +8682,6 @@
     <p:extLst>
       <p:ext uri="{BB962C8B-B14F-4D97-AF65-F5344CB8AC3E}">
         <p14:creationId xmlns:p14="http://schemas.microsoft.com/office/powerpoint/2010/main" val="2964140374"/>
-      </p:ext>
-    </p:extLst>
-  </p:cSld>
-  <p:clrMapOvr>
-    <a:masterClrMapping/>
-  </p:clrMapOvr>
-  <p:timing>
-    <p:tnLst>
-      <p:par>
-        <p:cTn id="1" dur="indefinite" restart="never" nodeType="tmRoot"/>
-      </p:par>
-    </p:tnLst>
-  </p:timing>
-</p:sld>
-</file>
-
-<file path=ppt/slides/slide9.xml><?xml version="1.0" encoding="utf-8"?>
-<p:sld xmlns:a="http://schemas.openxmlformats.org/drawingml/2006/main" xmlns:r="http://schemas.openxmlformats.org/officeDocument/2006/relationships" xmlns:p="http://schemas.openxmlformats.org/presentationml/2006/main">
-  <p:cSld>
-    <p:spTree>
-      <p:nvGrpSpPr>
-        <p:cNvPr id="1" name=""/>
-        <p:cNvGrpSpPr/>
-        <p:nvPr/>
-      </p:nvGrpSpPr>
-      <p:grpSpPr>
-        <a:xfrm>
-          <a:off x="0" y="0"/>
-          <a:ext cx="0" cy="0"/>
-          <a:chOff x="0" y="0"/>
-          <a:chExt cx="0" cy="0"/>
-        </a:xfrm>
-      </p:grpSpPr>
-      <p:sp>
-        <p:nvSpPr>
-          <p:cNvPr id="3" name="Title 1"/>
-          <p:cNvSpPr txBox="1">
-            <a:spLocks/>
-          </p:cNvSpPr>
-          <p:nvPr/>
-        </p:nvSpPr>
-        <p:spPr>
-          <a:xfrm>
-            <a:off x="1372676" y="822025"/>
-            <a:ext cx="9601196" cy="1303867"/>
-          </a:xfrm>
-          <a:prstGeom prst="rect">
-            <a:avLst/>
-          </a:prstGeom>
-        </p:spPr>
-        <p:txBody>
-          <a:bodyPr/>
-          <a:lstStyle>
-            <a:lvl1pPr algn="ctr" defTabSz="457200" rtl="0" eaLnBrk="1" latinLnBrk="0" hangingPunct="1">
-              <a:spcBef>
-                <a:spcPct val="0"/>
-              </a:spcBef>
-              <a:buNone/>
-              <a:defRPr sz="4400" kern="1200" cap="none">
-                <a:ln w="3175" cmpd="sng">
-                  <a:noFill/>
-                </a:ln>
-                <a:solidFill>
-                  <a:schemeClr val="tx1">
-                    <a:lumMod val="85000"/>
-                    <a:lumOff val="15000"/>
-                  </a:schemeClr>
-                </a:solidFill>
-                <a:effectLst/>
-                <a:latin typeface="+mj-lt"/>
-                <a:ea typeface="+mj-ea"/>
-                <a:cs typeface="+mj-cs"/>
-              </a:defRPr>
-            </a:lvl1pPr>
-            <a:lvl2pPr eaLnBrk="1" hangingPunct="1">
-              <a:defRPr>
-                <a:solidFill>
-                  <a:schemeClr val="tx2"/>
-                </a:solidFill>
-              </a:defRPr>
-            </a:lvl2pPr>
-            <a:lvl3pPr eaLnBrk="1" hangingPunct="1">
-              <a:defRPr>
-                <a:solidFill>
-                  <a:schemeClr val="tx2"/>
-                </a:solidFill>
-              </a:defRPr>
-            </a:lvl3pPr>
-            <a:lvl4pPr eaLnBrk="1" hangingPunct="1">
-              <a:defRPr>
-                <a:solidFill>
-                  <a:schemeClr val="tx2"/>
-                </a:solidFill>
-              </a:defRPr>
-            </a:lvl4pPr>
-            <a:lvl5pPr eaLnBrk="1" hangingPunct="1">
-              <a:defRPr>
-                <a:solidFill>
-                  <a:schemeClr val="tx2"/>
-                </a:solidFill>
-              </a:defRPr>
-            </a:lvl5pPr>
-            <a:lvl6pPr eaLnBrk="1" hangingPunct="1">
-              <a:defRPr>
-                <a:solidFill>
-                  <a:schemeClr val="tx2"/>
-                </a:solidFill>
-              </a:defRPr>
-            </a:lvl6pPr>
-            <a:lvl7pPr eaLnBrk="1" hangingPunct="1">
-              <a:defRPr>
-                <a:solidFill>
-                  <a:schemeClr val="tx2"/>
-                </a:solidFill>
-              </a:defRPr>
-            </a:lvl7pPr>
-            <a:lvl8pPr eaLnBrk="1" hangingPunct="1">
-              <a:defRPr>
-                <a:solidFill>
-                  <a:schemeClr val="tx2"/>
-                </a:solidFill>
-              </a:defRPr>
-            </a:lvl8pPr>
-            <a:lvl9pPr eaLnBrk="1" hangingPunct="1">
-              <a:defRPr>
-                <a:solidFill>
-                  <a:schemeClr val="tx2"/>
-                </a:solidFill>
-              </a:defRPr>
-            </a:lvl9pPr>
-          </a:lstStyle>
-          <a:p>
-            <a:r>
-              <a:rPr lang="en-US" dirty="0" smtClean="0"/>
-              <a:t>Classes</a:t>
-            </a:r>
-            <a:endParaRPr lang="en-US" b="1" dirty="0"/>
-          </a:p>
-        </p:txBody>
-      </p:sp>
-      <p:pic>
-        <p:nvPicPr>
-          <p:cNvPr id="2" name="Picture 1"/>
-          <p:cNvPicPr>
-            <a:picLocks noChangeAspect="1"/>
-          </p:cNvPicPr>
-          <p:nvPr/>
-        </p:nvPicPr>
-        <p:blipFill>
-          <a:blip r:embed="rId2"/>
-          <a:stretch>
-            <a:fillRect/>
-          </a:stretch>
-        </p:blipFill>
-        <p:spPr>
-          <a:xfrm>
-            <a:off x="772260" y="994091"/>
-            <a:ext cx="4211864" cy="5119876"/>
-          </a:xfrm>
-          <a:prstGeom prst="rect">
-            <a:avLst/>
-          </a:prstGeom>
-        </p:spPr>
-      </p:pic>
-    </p:spTree>
-    <p:extLst>
-      <p:ext uri="{BB962C8B-B14F-4D97-AF65-F5344CB8AC3E}">
-        <p14:creationId xmlns:p14="http://schemas.microsoft.com/office/powerpoint/2010/main" val="3439156172"/>
       </p:ext>
     </p:extLst>
   </p:cSld>

</xml_diff>